<commit_message>
Updated data_cleaning notebook w/new green sidebars.
</commit_message>
<xml_diff>
--- a/presentations/01_nlp_intro.pptx
+++ b/presentations/01_nlp_intro.pptx
@@ -20,11 +20,11 @@
     <p:sldId id="331" r:id="rId11"/>
     <p:sldId id="330" r:id="rId12"/>
     <p:sldId id="332" r:id="rId13"/>
-    <p:sldId id="323" r:id="rId14"/>
-    <p:sldId id="327" r:id="rId15"/>
-    <p:sldId id="347" r:id="rId16"/>
-    <p:sldId id="346" r:id="rId17"/>
-    <p:sldId id="329" r:id="rId18"/>
+    <p:sldId id="348" r:id="rId14"/>
+    <p:sldId id="323" r:id="rId15"/>
+    <p:sldId id="327" r:id="rId16"/>
+    <p:sldId id="347" r:id="rId17"/>
+    <p:sldId id="346" r:id="rId18"/>
   </p:sldIdLst>
   <p:sldSz cx="12192000" cy="6858000"/>
   <p:notesSz cx="6858000" cy="9144000"/>
@@ -3344,7 +3344,7 @@
           <a:p>
             <a:fld id="{FD93C9B2-20F6-4DB1-B471-224337D0AC79}" type="datetimeFigureOut">
               <a:rPr lang="en-US" smtClean="0"/>
-              <a:t>10/12/2022</a:t>
+              <a:t>10/13/2022</a:t>
             </a:fld>
             <a:endParaRPr lang="en-US"/>
           </a:p>
@@ -3768,7 +3768,19 @@
               <a:rPr lang="en-US" sz="1200" b="0" i="0" u="none" strike="noStrike" baseline="0" dirty="0">
                 <a:latin typeface="+mn-lt"/>
               </a:rPr>
-              <a:t>Normalize case – we usually don't want "car", "CAR", "Car", and "caR" to be treated as separate entities. To do so, we typically convert all text into lowercase (we could also convert it into uppercase if we wanted).</a:t>
+              <a:t>Normalize case – we usually don't want "cat", "CAT", "Cat", and "</a:t>
+            </a:r>
+            <a:r>
+              <a:rPr lang="en-US" sz="1200" b="0" i="0" u="none" strike="noStrike" baseline="0" dirty="0" err="1">
+                <a:latin typeface="+mn-lt"/>
+              </a:rPr>
+              <a:t>caT</a:t>
+            </a:r>
+            <a:r>
+              <a:rPr lang="en-US" sz="1200" b="0" i="0" u="none" strike="noStrike" baseline="0" dirty="0">
+                <a:latin typeface="+mn-lt"/>
+              </a:rPr>
+              <a:t>" to be treated as separate entities. To do so, we typically convert all text into lowercase (we could also convert it into uppercase if we wanted).</a:t>
             </a:r>
           </a:p>
           <a:p>
@@ -4152,177 +4164,10 @@
           <a:bodyPr/>
           <a:lstStyle/>
           <a:p>
-            <a:pPr marL="0" indent="0">
-              <a:buFont typeface="Arial" panose="020B0604020202020204" pitchFamily="34" charset="0"/>
-              <a:buNone/>
-            </a:pPr>
-            <a:r>
-              <a:rPr lang="en-US" sz="1200" dirty="0">
-                <a:solidFill>
-                  <a:schemeClr val="tx1">
-                    <a:lumMod val="65000"/>
-                    <a:lumOff val="35000"/>
-                  </a:schemeClr>
-                </a:solidFill>
-                <a:latin typeface="Palatino Linotype" panose="02040502050505030304" pitchFamily="18" charset="0"/>
-              </a:rPr>
-              <a:t>Today’s second notebook contains three data prep exercises, with a fourth one that is optional:</a:t>
-            </a:r>
-          </a:p>
-          <a:p>
-            <a:pPr marL="0" indent="0">
-              <a:buFont typeface="Arial" panose="020B0604020202020204" pitchFamily="34" charset="0"/>
-              <a:buNone/>
-            </a:pPr>
-            <a:endParaRPr lang="en-US" sz="1200" dirty="0">
-              <a:solidFill>
-                <a:schemeClr val="tx1">
-                  <a:lumMod val="65000"/>
-                  <a:lumOff val="35000"/>
-                </a:schemeClr>
-              </a:solidFill>
-              <a:latin typeface="Palatino Linotype" panose="02040502050505030304" pitchFamily="18" charset="0"/>
-            </a:endParaRPr>
-          </a:p>
-          <a:p>
-            <a:pPr marL="171450" indent="-171450">
-              <a:buFont typeface="Arial" panose="020B0604020202020204" pitchFamily="34" charset="0"/>
-              <a:buChar char="•"/>
-            </a:pPr>
-            <a:r>
-              <a:rPr lang="en-US" sz="1200" dirty="0">
-                <a:solidFill>
-                  <a:schemeClr val="tx1">
-                    <a:lumMod val="65000"/>
-                    <a:lumOff val="35000"/>
-                  </a:schemeClr>
-                </a:solidFill>
-                <a:latin typeface="Palatino Linotype" panose="02040502050505030304" pitchFamily="18" charset="0"/>
-              </a:rPr>
-              <a:t>4.01 (Tokenization, Case Normalization, and Stop Word Removal) – page 166</a:t>
-            </a:r>
-          </a:p>
-          <a:p>
-            <a:pPr marL="171450" indent="-171450">
-              <a:buFont typeface="Arial" panose="020B0604020202020204" pitchFamily="34" charset="0"/>
-              <a:buChar char="•"/>
-            </a:pPr>
-            <a:r>
-              <a:rPr lang="en-US" sz="1200" dirty="0">
-                <a:solidFill>
-                  <a:schemeClr val="tx1">
-                    <a:lumMod val="65000"/>
-                    <a:lumOff val="35000"/>
-                  </a:schemeClr>
-                </a:solidFill>
-                <a:latin typeface="Palatino Linotype" panose="02040502050505030304" pitchFamily="18" charset="0"/>
-              </a:rPr>
-              <a:t>4.02 (Stemming our Data) – page 172</a:t>
-            </a:r>
-          </a:p>
-          <a:p>
-            <a:pPr marL="171450" indent="-171450">
-              <a:buFont typeface="Arial" panose="020B0604020202020204" pitchFamily="34" charset="0"/>
-              <a:buChar char="•"/>
-            </a:pPr>
-            <a:r>
-              <a:rPr lang="en-US" sz="1200" dirty="0">
-                <a:solidFill>
-                  <a:schemeClr val="tx1">
-                    <a:lumMod val="65000"/>
-                    <a:lumOff val="35000"/>
-                  </a:schemeClr>
-                </a:solidFill>
-                <a:latin typeface="Palatino Linotype" panose="02040502050505030304" pitchFamily="18" charset="0"/>
-              </a:rPr>
-              <a:t>4.03 (</a:t>
-            </a:r>
-            <a:r>
-              <a:rPr lang="en-US" sz="1200" b="0" i="0" dirty="0">
-                <a:solidFill>
-                  <a:schemeClr val="tx1">
-                    <a:lumMod val="65000"/>
-                    <a:lumOff val="35000"/>
-                  </a:schemeClr>
-                </a:solidFill>
-                <a:effectLst/>
-                <a:latin typeface="Palatino Linotype" panose="02040502050505030304" pitchFamily="18" charset="0"/>
-              </a:rPr>
-              <a:t>Creating One-Hot Encoding for Our Data</a:t>
-            </a:r>
-            <a:r>
-              <a:rPr lang="en-US" sz="1200" dirty="0">
-                <a:solidFill>
-                  <a:schemeClr val="tx1">
-                    <a:lumMod val="65000"/>
-                    <a:lumOff val="35000"/>
-                  </a:schemeClr>
-                </a:solidFill>
-                <a:latin typeface="Palatino Linotype" panose="02040502050505030304" pitchFamily="18" charset="0"/>
-              </a:rPr>
-              <a:t>) – page 181</a:t>
-            </a:r>
-            <a:endParaRPr lang="en-US" dirty="0"/>
-          </a:p>
-          <a:p>
-            <a:pPr marL="0" marR="0" lvl="0" indent="0" algn="l" defTabSz="914400" rtl="0" eaLnBrk="1" fontAlgn="auto" latinLnBrk="0" hangingPunct="1">
-              <a:lnSpc>
-                <a:spcPct val="100000"/>
-              </a:lnSpc>
-              <a:spcBef>
-                <a:spcPts val="0"/>
-              </a:spcBef>
-              <a:spcAft>
-                <a:spcPts val="0"/>
-              </a:spcAft>
-              <a:buClrTx/>
-              <a:buSzTx/>
-              <a:buFontTx/>
-              <a:buNone/>
-              <a:tabLst/>
-              <a:defRPr/>
-            </a:pPr>
-            <a:endParaRPr lang="en-US" dirty="0"/>
-          </a:p>
-          <a:p>
-            <a:pPr marL="0" marR="0" lvl="0" indent="0" algn="l" defTabSz="914400" rtl="0" eaLnBrk="1" fontAlgn="auto" latinLnBrk="0" hangingPunct="1">
-              <a:lnSpc>
-                <a:spcPct val="100000"/>
-              </a:lnSpc>
-              <a:spcBef>
-                <a:spcPts val="0"/>
-              </a:spcBef>
-              <a:spcAft>
-                <a:spcPts val="0"/>
-              </a:spcAft>
-              <a:buClrTx/>
-              <a:buSzTx/>
-              <a:buFontTx/>
-              <a:buNone/>
-              <a:tabLst/>
-              <a:defRPr/>
-            </a:pPr>
-            <a:endParaRPr lang="en-US" dirty="0"/>
-          </a:p>
-          <a:p>
-            <a:pPr marL="0" marR="0" lvl="0" indent="0" algn="l" defTabSz="914400" rtl="0" eaLnBrk="1" fontAlgn="auto" latinLnBrk="0" hangingPunct="1">
-              <a:lnSpc>
-                <a:spcPct val="100000"/>
-              </a:lnSpc>
-              <a:spcBef>
-                <a:spcPts val="0"/>
-              </a:spcBef>
-              <a:spcAft>
-                <a:spcPts val="0"/>
-              </a:spcAft>
-              <a:buClrTx/>
-              <a:buSzTx/>
-              <a:buFontTx/>
-              <a:buNone/>
-              <a:tabLst/>
-              <a:defRPr/>
-            </a:pPr>
-            <a:endParaRPr lang="en-US" dirty="0"/>
+            <a:r>
+              <a:rPr lang="en-US" dirty="0"/>
+              <a:t>Unfortunately, I did not have time to create a set of slides for term frequencies – text representations which tell us how often a word appears in a body of text.  The notebook, however, has some introductory content and an exercise on this topic.</a:t>
+            </a:r>
           </a:p>
         </p:txBody>
       </p:sp>
@@ -4352,7 +4197,7 @@
     </p:spTree>
     <p:extLst>
       <p:ext uri="{BB962C8B-B14F-4D97-AF65-F5344CB8AC3E}">
-        <p14:creationId xmlns:p14="http://schemas.microsoft.com/office/powerpoint/2010/main" val="2820707112"/>
+        <p14:creationId xmlns:p14="http://schemas.microsoft.com/office/powerpoint/2010/main" val="784065257"/>
       </p:ext>
     </p:extLst>
   </p:cSld>
@@ -4406,27 +4251,117 @@
           <a:bodyPr/>
           <a:lstStyle/>
           <a:p>
-            <a:pPr marL="0" marR="0" lvl="0" indent="0" algn="l" defTabSz="914400" rtl="0" eaLnBrk="1" fontAlgn="auto" latinLnBrk="0" hangingPunct="1">
-              <a:lnSpc>
-                <a:spcPct val="100000"/>
-              </a:lnSpc>
-              <a:spcBef>
-                <a:spcPts val="0"/>
-              </a:spcBef>
-              <a:spcAft>
-                <a:spcPts val="0"/>
-              </a:spcAft>
-              <a:buClrTx/>
-              <a:buSzTx/>
-              <a:buFontTx/>
+            <a:pPr marL="0" indent="0">
+              <a:buFont typeface="Arial" panose="020B0604020202020204" pitchFamily="34" charset="0"/>
               <a:buNone/>
-              <a:tabLst/>
-              <a:defRPr/>
             </a:pPr>
             <a:r>
-              <a:rPr lang="en-US" dirty="0"/>
-              <a:t>This exercise is optional and is included in the notebook for this session.</a:t>
-            </a:r>
+              <a:rPr lang="en-US" sz="1200" dirty="0">
+                <a:solidFill>
+                  <a:schemeClr val="tx1">
+                    <a:lumMod val="65000"/>
+                    <a:lumOff val="35000"/>
+                  </a:schemeClr>
+                </a:solidFill>
+                <a:latin typeface="Palatino Linotype" panose="02040502050505030304" pitchFamily="18" charset="0"/>
+              </a:rPr>
+              <a:t>Today’s second notebook contains three data prep exercises, with a fourth one that is optional:</a:t>
+            </a:r>
+          </a:p>
+          <a:p>
+            <a:pPr marL="0" indent="0">
+              <a:buFont typeface="Arial" panose="020B0604020202020204" pitchFamily="34" charset="0"/>
+              <a:buNone/>
+            </a:pPr>
+            <a:endParaRPr lang="en-US" sz="1200" dirty="0">
+              <a:solidFill>
+                <a:schemeClr val="tx1">
+                  <a:lumMod val="65000"/>
+                  <a:lumOff val="35000"/>
+                </a:schemeClr>
+              </a:solidFill>
+              <a:latin typeface="Palatino Linotype" panose="02040502050505030304" pitchFamily="18" charset="0"/>
+            </a:endParaRPr>
+          </a:p>
+          <a:p>
+            <a:pPr marL="171450" indent="-171450">
+              <a:buFont typeface="Arial" panose="020B0604020202020204" pitchFamily="34" charset="0"/>
+              <a:buChar char="•"/>
+            </a:pPr>
+            <a:r>
+              <a:rPr lang="en-US" sz="1200" dirty="0">
+                <a:solidFill>
+                  <a:schemeClr val="tx1">
+                    <a:lumMod val="65000"/>
+                    <a:lumOff val="35000"/>
+                  </a:schemeClr>
+                </a:solidFill>
+                <a:latin typeface="Palatino Linotype" panose="02040502050505030304" pitchFamily="18" charset="0"/>
+              </a:rPr>
+              <a:t>4.01 (Tokenization, Case Normalization, and Stop Word Removal) – page 166</a:t>
+            </a:r>
+          </a:p>
+          <a:p>
+            <a:pPr marL="171450" indent="-171450">
+              <a:buFont typeface="Arial" panose="020B0604020202020204" pitchFamily="34" charset="0"/>
+              <a:buChar char="•"/>
+            </a:pPr>
+            <a:r>
+              <a:rPr lang="en-US" sz="1200" dirty="0">
+                <a:solidFill>
+                  <a:schemeClr val="tx1">
+                    <a:lumMod val="65000"/>
+                    <a:lumOff val="35000"/>
+                  </a:schemeClr>
+                </a:solidFill>
+                <a:latin typeface="Palatino Linotype" panose="02040502050505030304" pitchFamily="18" charset="0"/>
+              </a:rPr>
+              <a:t>4.02 (Stemming our Data) – page 172</a:t>
+            </a:r>
+          </a:p>
+          <a:p>
+            <a:pPr marL="171450" indent="-171450">
+              <a:buFont typeface="Arial" panose="020B0604020202020204" pitchFamily="34" charset="0"/>
+              <a:buChar char="•"/>
+            </a:pPr>
+            <a:r>
+              <a:rPr lang="en-US" sz="1200" dirty="0">
+                <a:solidFill>
+                  <a:schemeClr val="tx1">
+                    <a:lumMod val="65000"/>
+                    <a:lumOff val="35000"/>
+                  </a:schemeClr>
+                </a:solidFill>
+                <a:latin typeface="Palatino Linotype" panose="02040502050505030304" pitchFamily="18" charset="0"/>
+              </a:rPr>
+              <a:t>4.03 (</a:t>
+            </a:r>
+            <a:r>
+              <a:rPr lang="en-US" sz="1200" b="0" i="0" dirty="0">
+                <a:solidFill>
+                  <a:schemeClr val="tx1">
+                    <a:lumMod val="65000"/>
+                    <a:lumOff val="35000"/>
+                  </a:schemeClr>
+                </a:solidFill>
+                <a:effectLst/>
+                <a:latin typeface="Palatino Linotype" panose="02040502050505030304" pitchFamily="18" charset="0"/>
+              </a:rPr>
+              <a:t>Creating One-Hot Encoding for Our Data</a:t>
+            </a:r>
+            <a:r>
+              <a:rPr lang="en-US" sz="1200" dirty="0">
+                <a:solidFill>
+                  <a:schemeClr val="tx1">
+                    <a:lumMod val="65000"/>
+                    <a:lumOff val="35000"/>
+                  </a:schemeClr>
+                </a:solidFill>
+                <a:latin typeface="Palatino Linotype" panose="02040502050505030304" pitchFamily="18" charset="0"/>
+              </a:rPr>
+              <a:t>) – page 181</a:t>
+            </a:r>
+            <a:endParaRPr lang="en-US" dirty="0"/>
           </a:p>
           <a:p>
             <a:pPr marL="0" marR="0" lvl="0" indent="0" algn="l" defTabSz="914400" rtl="0" eaLnBrk="1" fontAlgn="auto" latinLnBrk="0" hangingPunct="1">
@@ -4466,19 +4401,7 @@
               <a:tabLst/>
               <a:defRPr/>
             </a:pPr>
-            <a:r>
-              <a:rPr lang="en-US" sz="1200" dirty="0">
-                <a:solidFill>
-                  <a:schemeClr val="tx1">
-                    <a:lumMod val="65000"/>
-                    <a:lumOff val="35000"/>
-                  </a:schemeClr>
-                </a:solidFill>
-                <a:latin typeface="Palatino Linotype" panose="02040502050505030304" pitchFamily="18" charset="0"/>
-                <a:cs typeface="Segoe UI Light" panose="020B0502040204020203" pitchFamily="34" charset="0"/>
-              </a:rPr>
-              <a:t>4.04 (Document Term Matrix with TF-IDF) - Page 188</a:t>
-            </a:r>
+            <a:endParaRPr lang="en-US" dirty="0"/>
           </a:p>
           <a:p>
             <a:pPr marL="0" marR="0" lvl="0" indent="0" algn="l" defTabSz="914400" rtl="0" eaLnBrk="1" fontAlgn="auto" latinLnBrk="0" hangingPunct="1">
@@ -4528,7 +4451,7 @@
     </p:spTree>
     <p:extLst>
       <p:ext uri="{BB962C8B-B14F-4D97-AF65-F5344CB8AC3E}">
-        <p14:creationId xmlns:p14="http://schemas.microsoft.com/office/powerpoint/2010/main" val="1974960137"/>
+        <p14:creationId xmlns:p14="http://schemas.microsoft.com/office/powerpoint/2010/main" val="2820707112"/>
       </p:ext>
     </p:extLst>
   </p:cSld>
@@ -4582,14 +4505,99 @@
           <a:bodyPr/>
           <a:lstStyle/>
           <a:p>
-            <a:endParaRPr lang="en-US" dirty="0">
-              <a:latin typeface="Palatino Linotype" panose="02040502050505030304" pitchFamily="18" charset="0"/>
-            </a:endParaRPr>
-          </a:p>
-          <a:p>
-            <a:endParaRPr lang="en-US" dirty="0">
-              <a:latin typeface="Palatino Linotype" panose="02040502050505030304" pitchFamily="18" charset="0"/>
-            </a:endParaRPr>
+            <a:pPr marL="0" marR="0" lvl="0" indent="0" algn="l" defTabSz="914400" rtl="0" eaLnBrk="1" fontAlgn="auto" latinLnBrk="0" hangingPunct="1">
+              <a:lnSpc>
+                <a:spcPct val="100000"/>
+              </a:lnSpc>
+              <a:spcBef>
+                <a:spcPts val="0"/>
+              </a:spcBef>
+              <a:spcAft>
+                <a:spcPts val="0"/>
+              </a:spcAft>
+              <a:buClrTx/>
+              <a:buSzTx/>
+              <a:buFontTx/>
+              <a:buNone/>
+              <a:tabLst/>
+              <a:defRPr/>
+            </a:pPr>
+            <a:r>
+              <a:rPr lang="en-US" dirty="0"/>
+              <a:t>This exercise is optional and is included in the notebook for this session.</a:t>
+            </a:r>
+          </a:p>
+          <a:p>
+            <a:pPr marL="0" marR="0" lvl="0" indent="0" algn="l" defTabSz="914400" rtl="0" eaLnBrk="1" fontAlgn="auto" latinLnBrk="0" hangingPunct="1">
+              <a:lnSpc>
+                <a:spcPct val="100000"/>
+              </a:lnSpc>
+              <a:spcBef>
+                <a:spcPts val="0"/>
+              </a:spcBef>
+              <a:spcAft>
+                <a:spcPts val="0"/>
+              </a:spcAft>
+              <a:buClrTx/>
+              <a:buSzTx/>
+              <a:buFontTx/>
+              <a:buNone/>
+              <a:tabLst/>
+              <a:defRPr/>
+            </a:pPr>
+            <a:endParaRPr lang="en-US" dirty="0"/>
+          </a:p>
+          <a:p>
+            <a:pPr marL="0" marR="0" lvl="0" indent="0" algn="l" defTabSz="914400" rtl="0" eaLnBrk="1" fontAlgn="auto" latinLnBrk="0" hangingPunct="1">
+              <a:lnSpc>
+                <a:spcPct val="100000"/>
+              </a:lnSpc>
+              <a:spcBef>
+                <a:spcPts val="0"/>
+              </a:spcBef>
+              <a:spcAft>
+                <a:spcPts val="0"/>
+              </a:spcAft>
+              <a:buClrTx/>
+              <a:buSzTx/>
+              <a:buFontTx/>
+              <a:buNone/>
+              <a:tabLst/>
+              <a:defRPr/>
+            </a:pPr>
+            <a:r>
+              <a:rPr lang="en-US" sz="1200" dirty="0">
+                <a:solidFill>
+                  <a:schemeClr val="tx1">
+                    <a:lumMod val="65000"/>
+                    <a:lumOff val="35000"/>
+                  </a:schemeClr>
+                </a:solidFill>
+                <a:latin typeface="Palatino Linotype" panose="02040502050505030304" pitchFamily="18" charset="0"/>
+                <a:cs typeface="Segoe UI Light" panose="020B0502040204020203" pitchFamily="34" charset="0"/>
+              </a:rPr>
+              <a:t>4.04 (Document Term Matrix with TF-IDF) - Page 188</a:t>
+            </a:r>
+          </a:p>
+          <a:p>
+            <a:pPr marL="0" marR="0" lvl="0" indent="0" algn="l" defTabSz="914400" rtl="0" eaLnBrk="1" fontAlgn="auto" latinLnBrk="0" hangingPunct="1">
+              <a:lnSpc>
+                <a:spcPct val="100000"/>
+              </a:lnSpc>
+              <a:spcBef>
+                <a:spcPts val="0"/>
+              </a:spcBef>
+              <a:spcAft>
+                <a:spcPts val="0"/>
+              </a:spcAft>
+              <a:buClrTx/>
+              <a:buSzTx/>
+              <a:buFontTx/>
+              <a:buNone/>
+              <a:tabLst/>
+              <a:defRPr/>
+            </a:pPr>
+            <a:endParaRPr lang="en-US" dirty="0"/>
           </a:p>
         </p:txBody>
       </p:sp>
@@ -4610,7 +4618,7 @@
           <a:p>
             <a:fld id="{3148858F-F1DB-4027-9C85-CCA6849540DD}" type="slidenum">
               <a:rPr lang="en-US" smtClean="0"/>
-              <a:t>16</a:t>
+              <a:t>15</a:t>
             </a:fld>
             <a:endParaRPr lang="en-US"/>
           </a:p>
@@ -4619,7 +4627,7 @@
     </p:spTree>
     <p:extLst>
       <p:ext uri="{BB962C8B-B14F-4D97-AF65-F5344CB8AC3E}">
-        <p14:creationId xmlns:p14="http://schemas.microsoft.com/office/powerpoint/2010/main" val="2023840696"/>
+        <p14:creationId xmlns:p14="http://schemas.microsoft.com/office/powerpoint/2010/main" val="1974960137"/>
       </p:ext>
     </p:extLst>
   </p:cSld>
@@ -4673,7 +4681,14 @@
           <a:bodyPr/>
           <a:lstStyle/>
           <a:p>
-            <a:endParaRPr lang="en-US" dirty="0"/>
+            <a:endParaRPr lang="en-US" dirty="0">
+              <a:latin typeface="Palatino Linotype" panose="02040502050505030304" pitchFamily="18" charset="0"/>
+            </a:endParaRPr>
+          </a:p>
+          <a:p>
+            <a:endParaRPr lang="en-US" dirty="0">
+              <a:latin typeface="Palatino Linotype" panose="02040502050505030304" pitchFamily="18" charset="0"/>
+            </a:endParaRPr>
           </a:p>
         </p:txBody>
       </p:sp>
@@ -4703,7 +4718,7 @@
     </p:spTree>
     <p:extLst>
       <p:ext uri="{BB962C8B-B14F-4D97-AF65-F5344CB8AC3E}">
-        <p14:creationId xmlns:p14="http://schemas.microsoft.com/office/powerpoint/2010/main" val="1555070171"/>
+        <p14:creationId xmlns:p14="http://schemas.microsoft.com/office/powerpoint/2010/main" val="2023840696"/>
       </p:ext>
     </p:extLst>
   </p:cSld>
@@ -5508,7 +5523,7 @@
                 <a:effectLst/>
                 <a:latin typeface="+mn-lt"/>
               </a:rPr>
-              <a:t>But before we go any further, we need to acknowledge that NLP isn't easy.  Here are three examples:</a:t>
+              <a:t>But before we go any further, we need to acknowledge that NLP isn't easy because language is ambiguous.  Here are three examples:</a:t>
             </a:r>
           </a:p>
           <a:p>
@@ -5533,7 +5548,7 @@
                 <a:effectLst/>
                 <a:latin typeface="+mn-lt"/>
               </a:rPr>
-              <a:t>Consider the following sentence: "</a:t>
+              <a:t>Consider this sentence: "</a:t>
             </a:r>
             <a:r>
               <a:rPr lang="en-US" b="0" i="1" dirty="0">
@@ -5568,7 +5583,7 @@
                 <a:effectLst/>
                 <a:latin typeface="+mn-lt"/>
               </a:rPr>
-              <a:t>Let's consider another sentence: “</a:t>
+              <a:t>And another sentence: “</a:t>
             </a:r>
             <a:r>
               <a:rPr lang="en-US" b="0" i="1" dirty="0">
@@ -5603,7 +5618,7 @@
                 <a:effectLst/>
                 <a:latin typeface="+mn-lt"/>
               </a:rPr>
-              <a:t>And finally, this sentence: "</a:t>
+              <a:t>And finally: "</a:t>
             </a:r>
             <a:r>
               <a:rPr lang="en-US" b="0" i="1" dirty="0">
@@ -5628,6 +5643,31 @@
           </a:p>
           <a:p>
             <a:pPr algn="l"/>
+            <a:endParaRPr lang="en-US" dirty="0"/>
+          </a:p>
+          <a:p>
+            <a:pPr algn="l"/>
+            <a:r>
+              <a:rPr lang="en-US" dirty="0"/>
+              <a:t>Winograd schemas developed by Hector Levesque – Pronoun resolution.</a:t>
+            </a:r>
+          </a:p>
+          <a:p>
+            <a:pPr algn="l"/>
+            <a:endParaRPr lang="en-US" dirty="0"/>
+          </a:p>
+          <a:p>
+            <a:pPr algn="l"/>
+            <a:r>
+              <a:rPr lang="en-US" b="0" i="0" dirty="0">
+                <a:solidFill>
+                  <a:srgbClr val="202122"/>
+                </a:solidFill>
+                <a:effectLst/>
+                <a:latin typeface="Arial" panose="020B0604020202020204" pitchFamily="34" charset="0"/>
+              </a:rPr>
+              <a:t>The city councilmen refused the demonstrators a permit because they [feared/advocated] violence. Does the pronoun 'they' refer to the city councilmen or the demonstrators?</a:t>
+            </a:r>
             <a:endParaRPr lang="en-US" dirty="0"/>
           </a:p>
         </p:txBody>
@@ -5712,6 +5752,35 @@
           <a:bodyPr/>
           <a:lstStyle/>
           <a:p>
+            <a:pPr marL="0" indent="0" algn="l">
+              <a:buNone/>
+            </a:pPr>
+            <a:r>
+              <a:rPr lang="en-US" b="0" i="0" dirty="0">
+                <a:solidFill>
+                  <a:srgbClr val="3C3C3B"/>
+                </a:solidFill>
+                <a:effectLst/>
+                <a:latin typeface="Calibri" panose="020F0502020204030204" pitchFamily="34" charset="0"/>
+                <a:cs typeface="Calibri" panose="020F0502020204030204" pitchFamily="34" charset="0"/>
+              </a:rPr>
+              <a:t>NLP is all around us, but it really took off when deep neural networks became a reality.</a:t>
+            </a:r>
+          </a:p>
+          <a:p>
+            <a:pPr marL="0" indent="0" algn="l">
+              <a:buNone/>
+            </a:pPr>
+            <a:endParaRPr lang="en-US" b="0" i="0" dirty="0">
+              <a:solidFill>
+                <a:srgbClr val="3C3C3B"/>
+              </a:solidFill>
+              <a:effectLst/>
+              <a:latin typeface="Calibri" panose="020F0502020204030204" pitchFamily="34" charset="0"/>
+              <a:cs typeface="Calibri" panose="020F0502020204030204" pitchFamily="34" charset="0"/>
+            </a:endParaRPr>
+          </a:p>
+          <a:p>
             <a:pPr marL="228600" indent="-228600" algn="l">
               <a:buAutoNum type="arabicPeriod"/>
             </a:pPr>
@@ -5872,22 +5941,6 @@
           <a:bodyPr/>
           <a:lstStyle/>
           <a:p>
-            <a:r>
-              <a:rPr lang="en-US" dirty="0"/>
-              <a:t>Link:  </a:t>
-            </a:r>
-            <a:r>
-              <a:rPr lang="en-US" dirty="0">
-                <a:solidFill>
-                  <a:schemeClr val="accent5">
-                    <a:lumMod val="75000"/>
-                  </a:schemeClr>
-                </a:solidFill>
-              </a:rPr>
-              <a:t>https://github.com/PracticumAI-Test/HPG_Jupyter_Setup</a:t>
-            </a:r>
-          </a:p>
-          <a:p>
             <a:endParaRPr lang="en-US" dirty="0"/>
           </a:p>
           <a:p>
@@ -6419,40 +6472,33 @@
           <a:p>
             <a:pPr algn="l"/>
             <a:r>
+              <a:rPr lang="en-US" sz="1200" b="1" i="0" u="none" strike="noStrike" baseline="0" dirty="0">
+                <a:latin typeface="+mn-lt"/>
+              </a:rPr>
+              <a:t>Tokenization</a:t>
+            </a:r>
+            <a:r>
               <a:rPr lang="en-US" sz="1200" b="0" i="0" u="none" strike="noStrike" baseline="0" dirty="0">
                 <a:latin typeface="+mn-lt"/>
               </a:rPr>
-              <a:t>The first step in preprocessing is usually </a:t>
+              <a:t> is typically the first step in text pre-processing.  It’s the splitting of a raw input text sequence into </a:t>
             </a:r>
             <a:r>
               <a:rPr lang="en-US" sz="1200" b="1" i="0" u="none" strike="noStrike" baseline="0" dirty="0">
                 <a:latin typeface="+mn-lt"/>
               </a:rPr>
-              <a:t>tokenization </a:t>
+              <a:t>tokens</a:t>
             </a:r>
             <a:r>
               <a:rPr lang="en-US" sz="1200" b="0" i="0" u="none" strike="noStrike" baseline="0" dirty="0">
                 <a:latin typeface="+mn-lt"/>
               </a:rPr>
-              <a:t>– splitting the raw input text sequence into </a:t>
-            </a:r>
-            <a:r>
-              <a:rPr lang="en-US" sz="1200" b="1" i="0" u="none" strike="noStrike" baseline="0" dirty="0">
-                <a:latin typeface="+mn-lt"/>
-              </a:rPr>
-              <a:t>tokens</a:t>
-            </a:r>
-            <a:r>
-              <a:rPr lang="en-US" sz="1200" b="0" i="0" u="none" strike="noStrike" baseline="0" dirty="0">
-                <a:latin typeface="+mn-lt"/>
-              </a:rPr>
-              <a:t>. In simple terms, it is breaking the raw text into constituent elements that you want to work on. This token can be a paragraph, sentence, word, or even a character. If you want to separate a paragraph into sentences, then you would tokenize the paragraph into sentences. If you want to separate the words in a sentence, then you would tokenize the sentence into words.</a:t>
-            </a:r>
-            <a:endParaRPr lang="en-US" sz="1200" b="0" i="0" dirty="0">
-              <a:solidFill>
-                <a:srgbClr val="3C3C3B"/>
-              </a:solidFill>
-              <a:effectLst/>
+              <a:t>. In simple terms, it is breaking the raw text into constituent elements that you want to work on. A token can be a paragraph, sentence, word, or even a character. </a:t>
+            </a:r>
+          </a:p>
+          <a:p>
+            <a:pPr algn="l"/>
+            <a:endParaRPr lang="en-US" sz="1200" b="0" i="0" u="none" strike="noStrike" baseline="0" dirty="0">
               <a:latin typeface="+mn-lt"/>
             </a:endParaRPr>
           </a:p>
@@ -6641,7 +6687,7 @@
           <a:p>
             <a:fld id="{C3F78080-8D0A-4BE8-A5B4-CB115102D524}" type="datetimeFigureOut">
               <a:rPr lang="en-US" smtClean="0"/>
-              <a:t>10/12/2022</a:t>
+              <a:t>10/13/2022</a:t>
             </a:fld>
             <a:endParaRPr lang="en-US"/>
           </a:p>
@@ -6839,7 +6885,7 @@
           <a:p>
             <a:fld id="{C3F78080-8D0A-4BE8-A5B4-CB115102D524}" type="datetimeFigureOut">
               <a:rPr lang="en-US" smtClean="0"/>
-              <a:t>10/12/2022</a:t>
+              <a:t>10/13/2022</a:t>
             </a:fld>
             <a:endParaRPr lang="en-US"/>
           </a:p>
@@ -7047,7 +7093,7 @@
           <a:p>
             <a:fld id="{C3F78080-8D0A-4BE8-A5B4-CB115102D524}" type="datetimeFigureOut">
               <a:rPr lang="en-US" smtClean="0"/>
-              <a:t>10/12/2022</a:t>
+              <a:t>10/13/2022</a:t>
             </a:fld>
             <a:endParaRPr lang="en-US"/>
           </a:p>
@@ -7245,7 +7291,7 @@
           <a:p>
             <a:fld id="{C3F78080-8D0A-4BE8-A5B4-CB115102D524}" type="datetimeFigureOut">
               <a:rPr lang="en-US" smtClean="0"/>
-              <a:t>10/12/2022</a:t>
+              <a:t>10/13/2022</a:t>
             </a:fld>
             <a:endParaRPr lang="en-US"/>
           </a:p>
@@ -7520,7 +7566,7 @@
           <a:p>
             <a:fld id="{C3F78080-8D0A-4BE8-A5B4-CB115102D524}" type="datetimeFigureOut">
               <a:rPr lang="en-US" smtClean="0"/>
-              <a:t>10/12/2022</a:t>
+              <a:t>10/13/2022</a:t>
             </a:fld>
             <a:endParaRPr lang="en-US"/>
           </a:p>
@@ -7785,7 +7831,7 @@
           <a:p>
             <a:fld id="{C3F78080-8D0A-4BE8-A5B4-CB115102D524}" type="datetimeFigureOut">
               <a:rPr lang="en-US" smtClean="0"/>
-              <a:t>10/12/2022</a:t>
+              <a:t>10/13/2022</a:t>
             </a:fld>
             <a:endParaRPr lang="en-US"/>
           </a:p>
@@ -8197,7 +8243,7 @@
           <a:p>
             <a:fld id="{C3F78080-8D0A-4BE8-A5B4-CB115102D524}" type="datetimeFigureOut">
               <a:rPr lang="en-US" smtClean="0"/>
-              <a:t>10/12/2022</a:t>
+              <a:t>10/13/2022</a:t>
             </a:fld>
             <a:endParaRPr lang="en-US"/>
           </a:p>
@@ -8338,7 +8384,7 @@
           <a:p>
             <a:fld id="{C3F78080-8D0A-4BE8-A5B4-CB115102D524}" type="datetimeFigureOut">
               <a:rPr lang="en-US" smtClean="0"/>
-              <a:t>10/12/2022</a:t>
+              <a:t>10/13/2022</a:t>
             </a:fld>
             <a:endParaRPr lang="en-US"/>
           </a:p>
@@ -8451,7 +8497,7 @@
           <a:p>
             <a:fld id="{C3F78080-8D0A-4BE8-A5B4-CB115102D524}" type="datetimeFigureOut">
               <a:rPr lang="en-US" smtClean="0"/>
-              <a:t>10/12/2022</a:t>
+              <a:t>10/13/2022</a:t>
             </a:fld>
             <a:endParaRPr lang="en-US"/>
           </a:p>
@@ -8762,7 +8808,7 @@
           <a:p>
             <a:fld id="{C3F78080-8D0A-4BE8-A5B4-CB115102D524}" type="datetimeFigureOut">
               <a:rPr lang="en-US" smtClean="0"/>
-              <a:t>10/12/2022</a:t>
+              <a:t>10/13/2022</a:t>
             </a:fld>
             <a:endParaRPr lang="en-US"/>
           </a:p>
@@ -9050,7 +9096,7 @@
           <a:p>
             <a:fld id="{C3F78080-8D0A-4BE8-A5B4-CB115102D524}" type="datetimeFigureOut">
               <a:rPr lang="en-US" smtClean="0"/>
-              <a:t>10/12/2022</a:t>
+              <a:t>10/13/2022</a:t>
             </a:fld>
             <a:endParaRPr lang="en-US"/>
           </a:p>
@@ -9291,7 +9337,7 @@
           <a:p>
             <a:fld id="{C3F78080-8D0A-4BE8-A5B4-CB115102D524}" type="datetimeFigureOut">
               <a:rPr lang="en-US" smtClean="0"/>
-              <a:t>10/12/2022</a:t>
+              <a:t>10/13/2022</a:t>
             </a:fld>
             <a:endParaRPr lang="en-US"/>
           </a:p>
@@ -10079,7 +10125,31 @@
                 <a:latin typeface="Palatino Linotype" panose="02040502050505030304" pitchFamily="18" charset="0"/>
                 <a:cs typeface="Segoe UI Light" panose="020B0502040204020203" pitchFamily="34" charset="0"/>
               </a:rPr>
-              <a:t>“CAR”, “Car”, and “caR”</a:t>
+              <a:t>“CAT”, “Cat”, and “</a:t>
+            </a:r>
+            <a:r>
+              <a:rPr lang="en-US" sz="3600" dirty="0" err="1">
+                <a:solidFill>
+                  <a:schemeClr val="accent1">
+                    <a:lumMod val="75000"/>
+                  </a:schemeClr>
+                </a:solidFill>
+                <a:latin typeface="Palatino Linotype" panose="02040502050505030304" pitchFamily="18" charset="0"/>
+                <a:cs typeface="Segoe UI Light" panose="020B0502040204020203" pitchFamily="34" charset="0"/>
+              </a:rPr>
+              <a:t>caT</a:t>
+            </a:r>
+            <a:r>
+              <a:rPr lang="en-US" sz="3600" dirty="0">
+                <a:solidFill>
+                  <a:schemeClr val="accent1">
+                    <a:lumMod val="75000"/>
+                  </a:schemeClr>
+                </a:solidFill>
+                <a:latin typeface="Palatino Linotype" panose="02040502050505030304" pitchFamily="18" charset="0"/>
+                <a:cs typeface="Segoe UI Light" panose="020B0502040204020203" pitchFamily="34" charset="0"/>
+              </a:rPr>
+              <a:t>”</a:t>
             </a:r>
           </a:p>
         </p:txBody>
@@ -11097,6 +11167,225 @@
           <a:chExt cx="0" cy="0"/>
         </a:xfrm>
       </p:grpSpPr>
+      <p:sp>
+        <p:nvSpPr>
+          <p:cNvPr id="4" name="Title 1">
+            <a:extLst>
+              <a:ext uri="{FF2B5EF4-FFF2-40B4-BE49-F238E27FC236}">
+                <a16:creationId xmlns:a16="http://schemas.microsoft.com/office/drawing/2014/main" id="{747FC3C3-9024-05CA-7BEE-3817AB80B6E3}"/>
+              </a:ext>
+            </a:extLst>
+          </p:cNvPr>
+          <p:cNvSpPr txBox="1">
+            <a:spLocks/>
+          </p:cNvSpPr>
+          <p:nvPr/>
+        </p:nvSpPr>
+        <p:spPr>
+          <a:xfrm>
+            <a:off x="0" y="772462"/>
+            <a:ext cx="12192000" cy="760138"/>
+          </a:xfrm>
+          <a:prstGeom prst="rect">
+            <a:avLst/>
+          </a:prstGeom>
+          <a:noFill/>
+        </p:spPr>
+        <p:txBody>
+          <a:bodyPr>
+            <a:noAutofit/>
+          </a:bodyPr>
+          <a:lstStyle>
+            <a:lvl1pPr algn="l" defTabSz="914400" rtl="0" eaLnBrk="1" latinLnBrk="0" hangingPunct="1">
+              <a:lnSpc>
+                <a:spcPct val="90000"/>
+              </a:lnSpc>
+              <a:spcBef>
+                <a:spcPct val="0"/>
+              </a:spcBef>
+              <a:buNone/>
+              <a:defRPr sz="4400" kern="1200">
+                <a:solidFill>
+                  <a:schemeClr val="tx1"/>
+                </a:solidFill>
+                <a:latin typeface="+mj-lt"/>
+                <a:ea typeface="+mj-ea"/>
+                <a:cs typeface="+mj-cs"/>
+              </a:defRPr>
+            </a:lvl1pPr>
+          </a:lstStyle>
+          <a:p>
+            <a:pPr algn="ctr"/>
+            <a:r>
+              <a:rPr lang="en-US" sz="4800" dirty="0">
+                <a:solidFill>
+                  <a:schemeClr val="tx1">
+                    <a:lumMod val="75000"/>
+                    <a:lumOff val="25000"/>
+                  </a:schemeClr>
+                </a:solidFill>
+                <a:latin typeface="Palatino Linotype" panose="02040502050505030304" pitchFamily="18" charset="0"/>
+              </a:rPr>
+              <a:t>Term Frequencies</a:t>
+            </a:r>
+            <a:endParaRPr lang="en-US" sz="4800" dirty="0">
+              <a:solidFill>
+                <a:schemeClr val="tx1">
+                  <a:lumMod val="75000"/>
+                  <a:lumOff val="25000"/>
+                </a:schemeClr>
+              </a:solidFill>
+              <a:latin typeface="Palatino Linotype" panose="02040502050505030304" pitchFamily="18" charset="0"/>
+              <a:cs typeface="Segoe UI Light" panose="020B0502040204020203" pitchFamily="34" charset="0"/>
+            </a:endParaRPr>
+          </a:p>
+        </p:txBody>
+      </p:sp>
+      <p:pic>
+        <p:nvPicPr>
+          <p:cNvPr id="1026" name="Picture 2" descr="2,728 Coming Soon Sign Stock Photos, Pictures &amp; Royalty-Free Images - iStock">
+            <a:extLst>
+              <a:ext uri="{FF2B5EF4-FFF2-40B4-BE49-F238E27FC236}">
+                <a16:creationId xmlns:a16="http://schemas.microsoft.com/office/drawing/2014/main" id="{88AACAD2-869C-0991-A56E-BF0C6BE76C07}"/>
+              </a:ext>
+            </a:extLst>
+          </p:cNvPr>
+          <p:cNvPicPr>
+            <a:picLocks noChangeAspect="1" noChangeArrowheads="1"/>
+          </p:cNvPicPr>
+          <p:nvPr/>
+        </p:nvPicPr>
+        <p:blipFill>
+          <a:blip r:embed="rId3">
+            <a:extLst>
+              <a:ext uri="{28A0092B-C50C-407E-A947-70E740481C1C}">
+                <a14:useLocalDpi xmlns:a14="http://schemas.microsoft.com/office/drawing/2010/main" val="0"/>
+              </a:ext>
+            </a:extLst>
+          </a:blip>
+          <a:srcRect/>
+          <a:stretch>
+            <a:fillRect/>
+          </a:stretch>
+        </p:blipFill>
+        <p:spPr bwMode="auto">
+          <a:xfrm>
+            <a:off x="3181350" y="2451360"/>
+            <a:ext cx="5829300" cy="2914650"/>
+          </a:xfrm>
+          <a:prstGeom prst="rect">
+            <a:avLst/>
+          </a:prstGeom>
+          <a:noFill/>
+          <a:extLst>
+            <a:ext uri="{909E8E84-426E-40DD-AFC4-6F175D3DCCD1}">
+              <a14:hiddenFill xmlns:a14="http://schemas.microsoft.com/office/drawing/2010/main">
+                <a:solidFill>
+                  <a:srgbClr val="FFFFFF"/>
+                </a:solidFill>
+              </a14:hiddenFill>
+            </a:ext>
+          </a:extLst>
+        </p:spPr>
+      </p:pic>
+      <p:sp>
+        <p:nvSpPr>
+          <p:cNvPr id="6" name="TextBox 5">
+            <a:extLst>
+              <a:ext uri="{FF2B5EF4-FFF2-40B4-BE49-F238E27FC236}">
+                <a16:creationId xmlns:a16="http://schemas.microsoft.com/office/drawing/2014/main" id="{FB264829-131F-9D33-2554-D4499258F3B4}"/>
+              </a:ext>
+            </a:extLst>
+          </p:cNvPr>
+          <p:cNvSpPr txBox="1"/>
+          <p:nvPr/>
+        </p:nvSpPr>
+        <p:spPr>
+          <a:xfrm>
+            <a:off x="0" y="6550223"/>
+            <a:ext cx="12192000" cy="307777"/>
+          </a:xfrm>
+          <a:prstGeom prst="rect">
+            <a:avLst/>
+          </a:prstGeom>
+          <a:noFill/>
+        </p:spPr>
+        <p:txBody>
+          <a:bodyPr wrap="square" rtlCol="0">
+            <a:spAutoFit/>
+          </a:bodyPr>
+          <a:lstStyle/>
+          <a:p>
+            <a:r>
+              <a:rPr lang="en-US" sz="1400" dirty="0">
+                <a:solidFill>
+                  <a:schemeClr val="tx1">
+                    <a:lumMod val="65000"/>
+                    <a:lumOff val="35000"/>
+                  </a:schemeClr>
+                </a:solidFill>
+                <a:latin typeface="+mj-lt"/>
+                <a:ea typeface="Verdana" panose="020B0604030504040204" pitchFamily="34" charset="0"/>
+              </a:rPr>
+              <a:t>Image Credit: </a:t>
+            </a:r>
+            <a:r>
+              <a:rPr lang="en-US" sz="1400" dirty="0">
+                <a:solidFill>
+                  <a:schemeClr val="tx1">
+                    <a:lumMod val="65000"/>
+                    <a:lumOff val="35000"/>
+                  </a:schemeClr>
+                </a:solidFill>
+              </a:rPr>
+              <a:t>https://www.istockphoto.com/photos/coming-soon-sign</a:t>
+            </a:r>
+            <a:r>
+              <a:rPr lang="en-US" sz="1400" dirty="0">
+                <a:solidFill>
+                  <a:schemeClr val="tx1">
+                    <a:lumMod val="65000"/>
+                    <a:lumOff val="35000"/>
+                  </a:schemeClr>
+                </a:solidFill>
+                <a:latin typeface="+mj-lt"/>
+                <a:ea typeface="Verdana" panose="020B0604030504040204" pitchFamily="34" charset="0"/>
+              </a:rPr>
+              <a:t> </a:t>
+            </a:r>
+          </a:p>
+        </p:txBody>
+      </p:sp>
+    </p:spTree>
+    <p:extLst>
+      <p:ext uri="{BB962C8B-B14F-4D97-AF65-F5344CB8AC3E}">
+        <p14:creationId xmlns:p14="http://schemas.microsoft.com/office/powerpoint/2010/main" val="4141290656"/>
+      </p:ext>
+    </p:extLst>
+  </p:cSld>
+  <p:clrMapOvr>
+    <a:masterClrMapping/>
+  </p:clrMapOvr>
+</p:sld>
+</file>
+
+<file path=ppt/slides/slide14.xml><?xml version="1.0" encoding="utf-8"?>
+<p:sld xmlns:a="http://schemas.openxmlformats.org/drawingml/2006/main" xmlns:r="http://schemas.openxmlformats.org/officeDocument/2006/relationships" xmlns:p="http://schemas.openxmlformats.org/presentationml/2006/main">
+  <p:cSld>
+    <p:spTree>
+      <p:nvGrpSpPr>
+        <p:cNvPr id="1" name=""/>
+        <p:cNvGrpSpPr/>
+        <p:nvPr/>
+      </p:nvGrpSpPr>
+      <p:grpSpPr>
+        <a:xfrm>
+          <a:off x="0" y="0"/>
+          <a:ext cx="0" cy="0"/>
+          <a:chOff x="0" y="0"/>
+          <a:chExt cx="0" cy="0"/>
+        </a:xfrm>
+      </p:grpSpPr>
       <p:pic>
         <p:nvPicPr>
           <p:cNvPr id="4" name="Picture 3">
@@ -11212,7 +11501,7 @@
 </p:sld>
 </file>
 
-<file path=ppt/slides/slide14.xml><?xml version="1.0" encoding="utf-8"?>
+<file path=ppt/slides/slide15.xml><?xml version="1.0" encoding="utf-8"?>
 <p:sld xmlns:a="http://schemas.openxmlformats.org/drawingml/2006/main" xmlns:r="http://schemas.openxmlformats.org/officeDocument/2006/relationships" xmlns:p="http://schemas.openxmlformats.org/presentationml/2006/main">
   <p:cSld>
     <p:spTree>
@@ -11359,7 +11648,7 @@
 </p:sld>
 </file>
 
-<file path=ppt/slides/slide15.xml><?xml version="1.0" encoding="utf-8"?>
+<file path=ppt/slides/slide16.xml><?xml version="1.0" encoding="utf-8"?>
 <p:sld xmlns:a="http://schemas.openxmlformats.org/drawingml/2006/main" xmlns:r="http://schemas.openxmlformats.org/officeDocument/2006/relationships" xmlns:p="http://schemas.openxmlformats.org/presentationml/2006/main">
   <p:cSld>
     <p:spTree>
@@ -11389,7 +11678,7 @@
 </p:sld>
 </file>
 
-<file path=ppt/slides/slide16.xml><?xml version="1.0" encoding="utf-8"?>
+<file path=ppt/slides/slide17.xml><?xml version="1.0" encoding="utf-8"?>
 <p:sld xmlns:a="http://schemas.openxmlformats.org/drawingml/2006/main" xmlns:r="http://schemas.openxmlformats.org/officeDocument/2006/relationships" xmlns:p="http://schemas.openxmlformats.org/presentationml/2006/main">
   <p:cSld>
     <p:spTree>
@@ -11490,441 +11779,6 @@
     <p:extLst>
       <p:ext uri="{BB962C8B-B14F-4D97-AF65-F5344CB8AC3E}">
         <p14:creationId xmlns:p14="http://schemas.microsoft.com/office/powerpoint/2010/main" val="2944933400"/>
-      </p:ext>
-    </p:extLst>
-  </p:cSld>
-  <p:clrMapOvr>
-    <a:masterClrMapping/>
-  </p:clrMapOvr>
-  <mc:AlternateContent xmlns:mc="http://schemas.openxmlformats.org/markup-compatibility/2006" xmlns:p14="http://schemas.microsoft.com/office/powerpoint/2010/main">
-    <mc:Choice Requires="p14">
-      <p:transition spd="med" p14:dur="700">
-        <p:fade/>
-      </p:transition>
-    </mc:Choice>
-    <mc:Fallback xmlns="">
-      <p:transition spd="med">
-        <p:fade/>
-      </p:transition>
-    </mc:Fallback>
-  </mc:AlternateContent>
-</p:sld>
-</file>
-
-<file path=ppt/slides/slide17.xml><?xml version="1.0" encoding="utf-8"?>
-<p:sld xmlns:a="http://schemas.openxmlformats.org/drawingml/2006/main" xmlns:r="http://schemas.openxmlformats.org/officeDocument/2006/relationships" xmlns:p="http://schemas.openxmlformats.org/presentationml/2006/main">
-  <p:cSld>
-    <p:spTree>
-      <p:nvGrpSpPr>
-        <p:cNvPr id="1" name=""/>
-        <p:cNvGrpSpPr/>
-        <p:nvPr/>
-      </p:nvGrpSpPr>
-      <p:grpSpPr>
-        <a:xfrm>
-          <a:off x="0" y="0"/>
-          <a:ext cx="0" cy="0"/>
-          <a:chOff x="0" y="0"/>
-          <a:chExt cx="0" cy="0"/>
-        </a:xfrm>
-      </p:grpSpPr>
-      <p:sp>
-        <p:nvSpPr>
-          <p:cNvPr id="6" name="Rectangle 5">
-            <a:extLst>
-              <a:ext uri="{FF2B5EF4-FFF2-40B4-BE49-F238E27FC236}">
-                <a16:creationId xmlns:a16="http://schemas.microsoft.com/office/drawing/2014/main" id="{0AED260D-91FC-4000-B413-7CBF6388F332}"/>
-              </a:ext>
-            </a:extLst>
-          </p:cNvPr>
-          <p:cNvSpPr/>
-          <p:nvPr/>
-        </p:nvSpPr>
-        <p:spPr>
-          <a:xfrm>
-            <a:off x="7799944" y="3567896"/>
-            <a:ext cx="1482954" cy="753006"/>
-          </a:xfrm>
-          <a:prstGeom prst="rect">
-            <a:avLst/>
-          </a:prstGeom>
-          <a:ln>
-            <a:solidFill>
-              <a:schemeClr val="tx1">
-                <a:lumMod val="65000"/>
-                <a:lumOff val="35000"/>
-              </a:schemeClr>
-            </a:solidFill>
-          </a:ln>
-          <a:effectLst>
-            <a:outerShdw blurRad="50800" dist="38100" dir="2700000" algn="tl" rotWithShape="0">
-              <a:prstClr val="black">
-                <a:alpha val="40000"/>
-              </a:prstClr>
-            </a:outerShdw>
-          </a:effectLst>
-        </p:spPr>
-        <p:style>
-          <a:lnRef idx="2">
-            <a:schemeClr val="accent1"/>
-          </a:lnRef>
-          <a:fillRef idx="1">
-            <a:schemeClr val="lt1"/>
-          </a:fillRef>
-          <a:effectRef idx="0">
-            <a:schemeClr val="accent1"/>
-          </a:effectRef>
-          <a:fontRef idx="minor">
-            <a:schemeClr val="dk1"/>
-          </a:fontRef>
-        </p:style>
-        <p:txBody>
-          <a:bodyPr tIns="45720" rtlCol="0" anchor="t" anchorCtr="0"/>
-          <a:lstStyle/>
-          <a:p>
-            <a:pPr algn="ctr"/>
-            <a:r>
-              <a:rPr lang="en-US" dirty="0">
-                <a:latin typeface="Palatino Linotype" panose="02040502050505030304" pitchFamily="18" charset="0"/>
-              </a:rPr>
-              <a:t>Other</a:t>
-            </a:r>
-            <a:endParaRPr lang="en-US" dirty="0"/>
-          </a:p>
-        </p:txBody>
-      </p:sp>
-      <p:sp>
-        <p:nvSpPr>
-          <p:cNvPr id="7" name="Rectangle 6">
-            <a:extLst>
-              <a:ext uri="{FF2B5EF4-FFF2-40B4-BE49-F238E27FC236}">
-                <a16:creationId xmlns:a16="http://schemas.microsoft.com/office/drawing/2014/main" id="{E260980E-7AEF-4A9A-8082-EB6FC9E0ED8C}"/>
-              </a:ext>
-            </a:extLst>
-          </p:cNvPr>
-          <p:cNvSpPr/>
-          <p:nvPr/>
-        </p:nvSpPr>
-        <p:spPr>
-          <a:xfrm>
-            <a:off x="5419750" y="2337435"/>
-            <a:ext cx="1757894" cy="753006"/>
-          </a:xfrm>
-          <a:prstGeom prst="rect">
-            <a:avLst/>
-          </a:prstGeom>
-          <a:ln>
-            <a:solidFill>
-              <a:schemeClr val="tx1">
-                <a:lumMod val="65000"/>
-                <a:lumOff val="35000"/>
-              </a:schemeClr>
-            </a:solidFill>
-          </a:ln>
-          <a:effectLst>
-            <a:outerShdw blurRad="50800" dist="38100" dir="2700000" algn="tl" rotWithShape="0">
-              <a:prstClr val="black">
-                <a:alpha val="40000"/>
-              </a:prstClr>
-            </a:outerShdw>
-          </a:effectLst>
-        </p:spPr>
-        <p:style>
-          <a:lnRef idx="2">
-            <a:schemeClr val="accent1"/>
-          </a:lnRef>
-          <a:fillRef idx="1">
-            <a:schemeClr val="lt1"/>
-          </a:fillRef>
-          <a:effectRef idx="0">
-            <a:schemeClr val="accent1"/>
-          </a:effectRef>
-          <a:fontRef idx="minor">
-            <a:schemeClr val="dk1"/>
-          </a:fontRef>
-        </p:style>
-        <p:txBody>
-          <a:bodyPr tIns="45720" rtlCol="0" anchor="t" anchorCtr="0"/>
-          <a:lstStyle/>
-          <a:p>
-            <a:pPr algn="ctr"/>
-            <a:r>
-              <a:rPr lang="en-US" dirty="0">
-                <a:latin typeface="Palatino Linotype" panose="02040502050505030304" pitchFamily="18" charset="0"/>
-              </a:rPr>
-              <a:t>Humanities</a:t>
-            </a:r>
-            <a:endParaRPr lang="en-US" dirty="0"/>
-          </a:p>
-        </p:txBody>
-      </p:sp>
-      <p:sp>
-        <p:nvSpPr>
-          <p:cNvPr id="8" name="Rectangle 7">
-            <a:extLst>
-              <a:ext uri="{FF2B5EF4-FFF2-40B4-BE49-F238E27FC236}">
-                <a16:creationId xmlns:a16="http://schemas.microsoft.com/office/drawing/2014/main" id="{0E92874E-9331-4F4C-ABDE-9C086CEA8A60}"/>
-              </a:ext>
-            </a:extLst>
-          </p:cNvPr>
-          <p:cNvSpPr/>
-          <p:nvPr/>
-        </p:nvSpPr>
-        <p:spPr>
-          <a:xfrm>
-            <a:off x="3036386" y="2337435"/>
-            <a:ext cx="1757894" cy="753006"/>
-          </a:xfrm>
-          <a:prstGeom prst="rect">
-            <a:avLst/>
-          </a:prstGeom>
-          <a:ln>
-            <a:solidFill>
-              <a:schemeClr val="tx1">
-                <a:lumMod val="65000"/>
-                <a:lumOff val="35000"/>
-              </a:schemeClr>
-            </a:solidFill>
-          </a:ln>
-          <a:effectLst>
-            <a:outerShdw blurRad="50800" dist="38100" dir="2700000" algn="tl" rotWithShape="0">
-              <a:prstClr val="black">
-                <a:alpha val="40000"/>
-              </a:prstClr>
-            </a:outerShdw>
-          </a:effectLst>
-        </p:spPr>
-        <p:style>
-          <a:lnRef idx="2">
-            <a:schemeClr val="accent1"/>
-          </a:lnRef>
-          <a:fillRef idx="1">
-            <a:schemeClr val="lt1"/>
-          </a:fillRef>
-          <a:effectRef idx="0">
-            <a:schemeClr val="accent1"/>
-          </a:effectRef>
-          <a:fontRef idx="minor">
-            <a:schemeClr val="dk1"/>
-          </a:fontRef>
-        </p:style>
-        <p:txBody>
-          <a:bodyPr tIns="45720" rtlCol="0" anchor="t" anchorCtr="0"/>
-          <a:lstStyle/>
-          <a:p>
-            <a:pPr algn="ctr"/>
-            <a:r>
-              <a:rPr lang="en-US" dirty="0">
-                <a:latin typeface="Palatino Linotype" panose="02040502050505030304" pitchFamily="18" charset="0"/>
-              </a:rPr>
-              <a:t>Arts</a:t>
-            </a:r>
-            <a:endParaRPr lang="en-US" dirty="0"/>
-          </a:p>
-        </p:txBody>
-      </p:sp>
-      <p:sp>
-        <p:nvSpPr>
-          <p:cNvPr id="12" name="Rectangle 11">
-            <a:extLst>
-              <a:ext uri="{FF2B5EF4-FFF2-40B4-BE49-F238E27FC236}">
-                <a16:creationId xmlns:a16="http://schemas.microsoft.com/office/drawing/2014/main" id="{8F83821C-3A0E-4A25-A9C8-69146CE3B874}"/>
-              </a:ext>
-            </a:extLst>
-          </p:cNvPr>
-          <p:cNvSpPr/>
-          <p:nvPr/>
-        </p:nvSpPr>
-        <p:spPr>
-          <a:xfrm>
-            <a:off x="3036385" y="3567896"/>
-            <a:ext cx="1757895" cy="753006"/>
-          </a:xfrm>
-          <a:prstGeom prst="rect">
-            <a:avLst/>
-          </a:prstGeom>
-          <a:ln>
-            <a:solidFill>
-              <a:schemeClr val="tx1">
-                <a:lumMod val="65000"/>
-                <a:lumOff val="35000"/>
-              </a:schemeClr>
-            </a:solidFill>
-          </a:ln>
-          <a:effectLst>
-            <a:outerShdw blurRad="50800" dist="38100" dir="2700000" algn="tl" rotWithShape="0">
-              <a:prstClr val="black">
-                <a:alpha val="40000"/>
-              </a:prstClr>
-            </a:outerShdw>
-          </a:effectLst>
-        </p:spPr>
-        <p:style>
-          <a:lnRef idx="2">
-            <a:schemeClr val="accent1"/>
-          </a:lnRef>
-          <a:fillRef idx="1">
-            <a:schemeClr val="lt1"/>
-          </a:fillRef>
-          <a:effectRef idx="0">
-            <a:schemeClr val="accent1"/>
-          </a:effectRef>
-          <a:fontRef idx="minor">
-            <a:schemeClr val="dk1"/>
-          </a:fontRef>
-        </p:style>
-        <p:txBody>
-          <a:bodyPr tIns="45720" rtlCol="0" anchor="t" anchorCtr="0"/>
-          <a:lstStyle/>
-          <a:p>
-            <a:pPr algn="ctr"/>
-            <a:r>
-              <a:rPr lang="en-US" dirty="0">
-                <a:latin typeface="Palatino Linotype" panose="02040502050505030304" pitchFamily="18" charset="0"/>
-              </a:rPr>
-              <a:t>Social Science</a:t>
-            </a:r>
-            <a:r>
-              <a:rPr lang="en-US" sz="1600" dirty="0">
-                <a:latin typeface="Palatino Linotype" panose="02040502050505030304" pitchFamily="18" charset="0"/>
-              </a:rPr>
-              <a:t>s</a:t>
-            </a:r>
-            <a:endParaRPr lang="en-US" sz="1600" dirty="0"/>
-          </a:p>
-        </p:txBody>
-      </p:sp>
-      <p:sp>
-        <p:nvSpPr>
-          <p:cNvPr id="14" name="Rectangle 13">
-            <a:extLst>
-              <a:ext uri="{FF2B5EF4-FFF2-40B4-BE49-F238E27FC236}">
-                <a16:creationId xmlns:a16="http://schemas.microsoft.com/office/drawing/2014/main" id="{4294EF1F-50C2-4C3B-80DC-74C7D03E62F6}"/>
-              </a:ext>
-            </a:extLst>
-          </p:cNvPr>
-          <p:cNvSpPr/>
-          <p:nvPr/>
-        </p:nvSpPr>
-        <p:spPr>
-          <a:xfrm>
-            <a:off x="5419749" y="3567896"/>
-            <a:ext cx="1757893" cy="753006"/>
-          </a:xfrm>
-          <a:prstGeom prst="rect">
-            <a:avLst/>
-          </a:prstGeom>
-          <a:ln>
-            <a:solidFill>
-              <a:schemeClr val="tx1">
-                <a:lumMod val="65000"/>
-                <a:lumOff val="35000"/>
-              </a:schemeClr>
-            </a:solidFill>
-          </a:ln>
-          <a:effectLst>
-            <a:outerShdw blurRad="50800" dist="38100" dir="2700000" algn="tl" rotWithShape="0">
-              <a:prstClr val="black">
-                <a:alpha val="40000"/>
-              </a:prstClr>
-            </a:outerShdw>
-          </a:effectLst>
-        </p:spPr>
-        <p:style>
-          <a:lnRef idx="2">
-            <a:schemeClr val="accent1"/>
-          </a:lnRef>
-          <a:fillRef idx="1">
-            <a:schemeClr val="lt1"/>
-          </a:fillRef>
-          <a:effectRef idx="0">
-            <a:schemeClr val="accent1"/>
-          </a:effectRef>
-          <a:fontRef idx="minor">
-            <a:schemeClr val="dk1"/>
-          </a:fontRef>
-        </p:style>
-        <p:txBody>
-          <a:bodyPr tIns="45720" rtlCol="0" anchor="t" anchorCtr="0"/>
-          <a:lstStyle/>
-          <a:p>
-            <a:pPr algn="ctr"/>
-            <a:r>
-              <a:rPr lang="en-US" dirty="0">
-                <a:latin typeface="Palatino Linotype" panose="02040502050505030304" pitchFamily="18" charset="0"/>
-              </a:rPr>
-              <a:t>Business</a:t>
-            </a:r>
-            <a:endParaRPr lang="en-US" dirty="0"/>
-          </a:p>
-        </p:txBody>
-      </p:sp>
-      <p:sp>
-        <p:nvSpPr>
-          <p:cNvPr id="16" name="Rectangle 15">
-            <a:extLst>
-              <a:ext uri="{FF2B5EF4-FFF2-40B4-BE49-F238E27FC236}">
-                <a16:creationId xmlns:a16="http://schemas.microsoft.com/office/drawing/2014/main" id="{D641EAC9-1F0C-490E-A240-22DFF4823135}"/>
-              </a:ext>
-            </a:extLst>
-          </p:cNvPr>
-          <p:cNvSpPr/>
-          <p:nvPr/>
-        </p:nvSpPr>
-        <p:spPr>
-          <a:xfrm>
-            <a:off x="7799944" y="2337435"/>
-            <a:ext cx="1482954" cy="753006"/>
-          </a:xfrm>
-          <a:prstGeom prst="rect">
-            <a:avLst/>
-          </a:prstGeom>
-          <a:ln>
-            <a:solidFill>
-              <a:schemeClr val="tx1">
-                <a:lumMod val="65000"/>
-                <a:lumOff val="35000"/>
-              </a:schemeClr>
-            </a:solidFill>
-          </a:ln>
-          <a:effectLst>
-            <a:outerShdw blurRad="50800" dist="38100" dir="2700000" algn="tl" rotWithShape="0">
-              <a:prstClr val="black">
-                <a:alpha val="40000"/>
-              </a:prstClr>
-            </a:outerShdw>
-          </a:effectLst>
-        </p:spPr>
-        <p:style>
-          <a:lnRef idx="2">
-            <a:schemeClr val="accent1"/>
-          </a:lnRef>
-          <a:fillRef idx="1">
-            <a:schemeClr val="lt1"/>
-          </a:fillRef>
-          <a:effectRef idx="0">
-            <a:schemeClr val="accent1"/>
-          </a:effectRef>
-          <a:fontRef idx="minor">
-            <a:schemeClr val="dk1"/>
-          </a:fontRef>
-        </p:style>
-        <p:txBody>
-          <a:bodyPr tIns="45720" rtlCol="0" anchor="t" anchorCtr="0"/>
-          <a:lstStyle/>
-          <a:p>
-            <a:pPr algn="ctr"/>
-            <a:r>
-              <a:rPr lang="en-US" dirty="0"/>
-              <a:t>Science</a:t>
-            </a:r>
-          </a:p>
-        </p:txBody>
-      </p:sp>
-    </p:spTree>
-    <p:extLst>
-      <p:ext uri="{BB962C8B-B14F-4D97-AF65-F5344CB8AC3E}">
-        <p14:creationId xmlns:p14="http://schemas.microsoft.com/office/powerpoint/2010/main" val="3167454443"/>
       </p:ext>
     </p:extLst>
   </p:cSld>
@@ -12467,7 +12321,7 @@
         </p:nvSpPr>
         <p:spPr>
           <a:xfrm>
-            <a:off x="0" y="2953213"/>
+            <a:off x="0" y="674708"/>
             <a:ext cx="12192000" cy="951574"/>
           </a:xfrm>
           <a:noFill/>
@@ -12565,6 +12419,228 @@
               <a:t>Ambiguous</a:t>
             </a:r>
             <a:endParaRPr lang="en-US" sz="6700" dirty="0">
+              <a:solidFill>
+                <a:srgbClr val="80BE63"/>
+              </a:solidFill>
+              <a:latin typeface="Palatino Linotype" panose="02040502050505030304" pitchFamily="18" charset="0"/>
+              <a:cs typeface="Segoe UI Light" panose="020B0502040204020203" pitchFamily="34" charset="0"/>
+            </a:endParaRPr>
+          </a:p>
+        </p:txBody>
+      </p:sp>
+      <p:sp>
+        <p:nvSpPr>
+          <p:cNvPr id="4" name="Title 1">
+            <a:extLst>
+              <a:ext uri="{FF2B5EF4-FFF2-40B4-BE49-F238E27FC236}">
+                <a16:creationId xmlns:a16="http://schemas.microsoft.com/office/drawing/2014/main" id="{3C0D47E6-9FAC-A40F-7FEF-71A6DB197B14}"/>
+              </a:ext>
+            </a:extLst>
+          </p:cNvPr>
+          <p:cNvSpPr txBox="1">
+            <a:spLocks/>
+          </p:cNvSpPr>
+          <p:nvPr/>
+        </p:nvSpPr>
+        <p:spPr>
+          <a:xfrm>
+            <a:off x="495924" y="2565966"/>
+            <a:ext cx="11696076" cy="671908"/>
+          </a:xfrm>
+          <a:prstGeom prst="rect">
+            <a:avLst/>
+          </a:prstGeom>
+          <a:noFill/>
+        </p:spPr>
+        <p:txBody>
+          <a:bodyPr vert="horz" lIns="91440" tIns="45720" rIns="91440" bIns="45720" rtlCol="0" anchor="b">
+            <a:normAutofit/>
+          </a:bodyPr>
+          <a:lstStyle>
+            <a:lvl1pPr algn="l" defTabSz="914400" rtl="0" eaLnBrk="1" latinLnBrk="0" hangingPunct="1">
+              <a:lnSpc>
+                <a:spcPct val="90000"/>
+              </a:lnSpc>
+              <a:spcBef>
+                <a:spcPct val="0"/>
+              </a:spcBef>
+              <a:buNone/>
+              <a:defRPr sz="6000" kern="1200">
+                <a:solidFill>
+                  <a:schemeClr val="tx1"/>
+                </a:solidFill>
+                <a:latin typeface="+mj-lt"/>
+                <a:ea typeface="+mj-ea"/>
+                <a:cs typeface="+mj-cs"/>
+              </a:defRPr>
+            </a:lvl1pPr>
+          </a:lstStyle>
+          <a:p>
+            <a:pPr marL="571500" indent="-571500">
+              <a:buFont typeface="Courier New" panose="02070309020205020404" pitchFamily="49" charset="0"/>
+              <a:buChar char="o"/>
+            </a:pPr>
+            <a:r>
+              <a:rPr lang="en-US" sz="3600" dirty="0">
+                <a:solidFill>
+                  <a:schemeClr val="tx1">
+                    <a:lumMod val="75000"/>
+                    <a:lumOff val="25000"/>
+                  </a:schemeClr>
+                </a:solidFill>
+                <a:latin typeface="Palatino Linotype" panose="02040502050505030304" pitchFamily="18" charset="0"/>
+              </a:rPr>
+              <a:t>The boy saw a man with a telescope.</a:t>
+            </a:r>
+            <a:endParaRPr lang="en-US" sz="3600" dirty="0">
+              <a:solidFill>
+                <a:srgbClr val="80BE63"/>
+              </a:solidFill>
+              <a:latin typeface="Palatino Linotype" panose="02040502050505030304" pitchFamily="18" charset="0"/>
+              <a:cs typeface="Segoe UI Light" panose="020B0502040204020203" pitchFamily="34" charset="0"/>
+            </a:endParaRPr>
+          </a:p>
+        </p:txBody>
+      </p:sp>
+      <p:sp>
+        <p:nvSpPr>
+          <p:cNvPr id="5" name="Title 1">
+            <a:extLst>
+              <a:ext uri="{FF2B5EF4-FFF2-40B4-BE49-F238E27FC236}">
+                <a16:creationId xmlns:a16="http://schemas.microsoft.com/office/drawing/2014/main" id="{16D977C3-7088-1C3B-2A86-FC467A475A52}"/>
+              </a:ext>
+            </a:extLst>
+          </p:cNvPr>
+          <p:cNvSpPr txBox="1">
+            <a:spLocks/>
+          </p:cNvSpPr>
+          <p:nvPr/>
+        </p:nvSpPr>
+        <p:spPr>
+          <a:xfrm>
+            <a:off x="495924" y="4674286"/>
+            <a:ext cx="11696076" cy="671908"/>
+          </a:xfrm>
+          <a:prstGeom prst="rect">
+            <a:avLst/>
+          </a:prstGeom>
+          <a:noFill/>
+        </p:spPr>
+        <p:txBody>
+          <a:bodyPr vert="horz" lIns="91440" tIns="45720" rIns="91440" bIns="45720" rtlCol="0" anchor="b">
+            <a:normAutofit/>
+          </a:bodyPr>
+          <a:lstStyle>
+            <a:lvl1pPr algn="l" defTabSz="914400" rtl="0" eaLnBrk="1" latinLnBrk="0" hangingPunct="1">
+              <a:lnSpc>
+                <a:spcPct val="90000"/>
+              </a:lnSpc>
+              <a:spcBef>
+                <a:spcPct val="0"/>
+              </a:spcBef>
+              <a:buNone/>
+              <a:defRPr sz="6000" kern="1200">
+                <a:solidFill>
+                  <a:schemeClr val="tx1"/>
+                </a:solidFill>
+                <a:latin typeface="+mj-lt"/>
+                <a:ea typeface="+mj-ea"/>
+                <a:cs typeface="+mj-cs"/>
+              </a:defRPr>
+            </a:lvl1pPr>
+          </a:lstStyle>
+          <a:p>
+            <a:pPr marL="571500" indent="-571500">
+              <a:buFont typeface="Courier New" panose="02070309020205020404" pitchFamily="49" charset="0"/>
+              <a:buChar char="o"/>
+            </a:pPr>
+            <a:r>
+              <a:rPr lang="en-US" sz="3600" dirty="0">
+                <a:solidFill>
+                  <a:schemeClr val="tx1">
+                    <a:lumMod val="75000"/>
+                    <a:lumOff val="25000"/>
+                  </a:schemeClr>
+                </a:solidFill>
+                <a:latin typeface="Palatino Linotype" panose="02040502050505030304" pitchFamily="18" charset="0"/>
+              </a:rPr>
+              <a:t>Robin has quit skydiving.</a:t>
+            </a:r>
+            <a:endParaRPr lang="en-US" sz="3600" dirty="0">
+              <a:solidFill>
+                <a:srgbClr val="80BE63"/>
+              </a:solidFill>
+              <a:latin typeface="Palatino Linotype" panose="02040502050505030304" pitchFamily="18" charset="0"/>
+              <a:cs typeface="Segoe UI Light" panose="020B0502040204020203" pitchFamily="34" charset="0"/>
+            </a:endParaRPr>
+          </a:p>
+        </p:txBody>
+      </p:sp>
+      <p:sp>
+        <p:nvSpPr>
+          <p:cNvPr id="6" name="Title 1">
+            <a:extLst>
+              <a:ext uri="{FF2B5EF4-FFF2-40B4-BE49-F238E27FC236}">
+                <a16:creationId xmlns:a16="http://schemas.microsoft.com/office/drawing/2014/main" id="{05396779-C523-7754-2849-7B959C8EB2A3}"/>
+              </a:ext>
+            </a:extLst>
+          </p:cNvPr>
+          <p:cNvSpPr txBox="1">
+            <a:spLocks/>
+          </p:cNvSpPr>
+          <p:nvPr/>
+        </p:nvSpPr>
+        <p:spPr>
+          <a:xfrm>
+            <a:off x="495924" y="3620126"/>
+            <a:ext cx="11696076" cy="671908"/>
+          </a:xfrm>
+          <a:prstGeom prst="rect">
+            <a:avLst/>
+          </a:prstGeom>
+          <a:noFill/>
+        </p:spPr>
+        <p:txBody>
+          <a:bodyPr vert="horz" lIns="91440" tIns="45720" rIns="91440" bIns="45720" rtlCol="0" anchor="b">
+            <a:normAutofit/>
+          </a:bodyPr>
+          <a:lstStyle>
+            <a:lvl1pPr algn="l" defTabSz="914400" rtl="0" eaLnBrk="1" latinLnBrk="0" hangingPunct="1">
+              <a:lnSpc>
+                <a:spcPct val="90000"/>
+              </a:lnSpc>
+              <a:spcBef>
+                <a:spcPct val="0"/>
+              </a:spcBef>
+              <a:buNone/>
+              <a:defRPr sz="6000" kern="1200">
+                <a:solidFill>
+                  <a:schemeClr val="tx1"/>
+                </a:solidFill>
+                <a:latin typeface="+mj-lt"/>
+                <a:ea typeface="+mj-ea"/>
+                <a:cs typeface="+mj-cs"/>
+              </a:defRPr>
+            </a:lvl1pPr>
+          </a:lstStyle>
+          <a:p>
+            <a:pPr marL="571500" indent="-571500">
+              <a:buFont typeface="Courier New" panose="02070309020205020404" pitchFamily="49" charset="0"/>
+              <a:buChar char="o"/>
+            </a:pPr>
+            <a:r>
+              <a:rPr lang="en-US" sz="3600" dirty="0">
+                <a:solidFill>
+                  <a:schemeClr val="tx1">
+                    <a:lumMod val="75000"/>
+                    <a:lumOff val="25000"/>
+                  </a:schemeClr>
+                </a:solidFill>
+                <a:latin typeface="Palatino Linotype" panose="02040502050505030304" pitchFamily="18" charset="0"/>
+              </a:rPr>
+              <a:t>Bob convinced Robin to buy a television for himself.</a:t>
+            </a:r>
+            <a:endParaRPr lang="en-US" sz="3600" dirty="0">
               <a:solidFill>
                 <a:srgbClr val="80BE63"/>
               </a:solidFill>
@@ -12596,6 +12672,200 @@
       </p:transition>
     </mc:Fallback>
   </mc:AlternateContent>
+  <p:timing>
+    <p:tnLst>
+      <p:par>
+        <p:cTn id="1" dur="indefinite" restart="never" nodeType="tmRoot">
+          <p:childTnLst>
+            <p:seq concurrent="1" nextAc="seek">
+              <p:cTn id="2" dur="indefinite" nodeType="mainSeq">
+                <p:childTnLst>
+                  <p:par>
+                    <p:cTn id="3" fill="hold">
+                      <p:stCondLst>
+                        <p:cond delay="indefinite"/>
+                      </p:stCondLst>
+                      <p:childTnLst>
+                        <p:par>
+                          <p:cTn id="4" fill="hold">
+                            <p:stCondLst>
+                              <p:cond delay="0"/>
+                            </p:stCondLst>
+                            <p:childTnLst>
+                              <p:par>
+                                <p:cTn id="5" presetID="10" presetClass="entr" presetSubtype="0" fill="hold" grpId="0" nodeType="clickEffect">
+                                  <p:stCondLst>
+                                    <p:cond delay="0"/>
+                                  </p:stCondLst>
+                                  <p:childTnLst>
+                                    <p:set>
+                                      <p:cBhvr>
+                                        <p:cTn id="6" dur="1" fill="hold">
+                                          <p:stCondLst>
+                                            <p:cond delay="0"/>
+                                          </p:stCondLst>
+                                        </p:cTn>
+                                        <p:tgtEl>
+                                          <p:spTgt spid="4"/>
+                                        </p:tgtEl>
+                                        <p:attrNameLst>
+                                          <p:attrName>style.visibility</p:attrName>
+                                        </p:attrNameLst>
+                                      </p:cBhvr>
+                                      <p:to>
+                                        <p:strVal val="visible"/>
+                                      </p:to>
+                                    </p:set>
+                                    <p:animEffect transition="in" filter="fade">
+                                      <p:cBhvr>
+                                        <p:cTn id="7" dur="500"/>
+                                        <p:tgtEl>
+                                          <p:spTgt spid="4"/>
+                                        </p:tgtEl>
+                                      </p:cBhvr>
+                                    </p:animEffect>
+                                  </p:childTnLst>
+                                </p:cTn>
+                              </p:par>
+                            </p:childTnLst>
+                          </p:cTn>
+                        </p:par>
+                      </p:childTnLst>
+                    </p:cTn>
+                  </p:par>
+                  <p:par>
+                    <p:cTn id="8" fill="hold">
+                      <p:stCondLst>
+                        <p:cond delay="indefinite"/>
+                      </p:stCondLst>
+                      <p:childTnLst>
+                        <p:par>
+                          <p:cTn id="9" fill="hold">
+                            <p:stCondLst>
+                              <p:cond delay="0"/>
+                            </p:stCondLst>
+                            <p:childTnLst>
+                              <p:par>
+                                <p:cTn id="10" presetID="10" presetClass="entr" presetSubtype="0" fill="hold" grpId="0" nodeType="clickEffect">
+                                  <p:stCondLst>
+                                    <p:cond delay="0"/>
+                                  </p:stCondLst>
+                                  <p:childTnLst>
+                                    <p:set>
+                                      <p:cBhvr>
+                                        <p:cTn id="11" dur="1" fill="hold">
+                                          <p:stCondLst>
+                                            <p:cond delay="0"/>
+                                          </p:stCondLst>
+                                        </p:cTn>
+                                        <p:tgtEl>
+                                          <p:spTgt spid="6"/>
+                                        </p:tgtEl>
+                                        <p:attrNameLst>
+                                          <p:attrName>style.visibility</p:attrName>
+                                        </p:attrNameLst>
+                                      </p:cBhvr>
+                                      <p:to>
+                                        <p:strVal val="visible"/>
+                                      </p:to>
+                                    </p:set>
+                                    <p:animEffect transition="in" filter="fade">
+                                      <p:cBhvr>
+                                        <p:cTn id="12" dur="500"/>
+                                        <p:tgtEl>
+                                          <p:spTgt spid="6"/>
+                                        </p:tgtEl>
+                                      </p:cBhvr>
+                                    </p:animEffect>
+                                  </p:childTnLst>
+                                </p:cTn>
+                              </p:par>
+                            </p:childTnLst>
+                          </p:cTn>
+                        </p:par>
+                      </p:childTnLst>
+                    </p:cTn>
+                  </p:par>
+                  <p:par>
+                    <p:cTn id="13" fill="hold">
+                      <p:stCondLst>
+                        <p:cond delay="indefinite"/>
+                      </p:stCondLst>
+                      <p:childTnLst>
+                        <p:par>
+                          <p:cTn id="14" fill="hold">
+                            <p:stCondLst>
+                              <p:cond delay="0"/>
+                            </p:stCondLst>
+                            <p:childTnLst>
+                              <p:par>
+                                <p:cTn id="15" presetID="10" presetClass="entr" presetSubtype="0" fill="hold" grpId="0" nodeType="clickEffect">
+                                  <p:stCondLst>
+                                    <p:cond delay="0"/>
+                                  </p:stCondLst>
+                                  <p:childTnLst>
+                                    <p:set>
+                                      <p:cBhvr>
+                                        <p:cTn id="16" dur="1" fill="hold">
+                                          <p:stCondLst>
+                                            <p:cond delay="0"/>
+                                          </p:stCondLst>
+                                        </p:cTn>
+                                        <p:tgtEl>
+                                          <p:spTgt spid="5"/>
+                                        </p:tgtEl>
+                                        <p:attrNameLst>
+                                          <p:attrName>style.visibility</p:attrName>
+                                        </p:attrNameLst>
+                                      </p:cBhvr>
+                                      <p:to>
+                                        <p:strVal val="visible"/>
+                                      </p:to>
+                                    </p:set>
+                                    <p:animEffect transition="in" filter="fade">
+                                      <p:cBhvr>
+                                        <p:cTn id="17" dur="500"/>
+                                        <p:tgtEl>
+                                          <p:spTgt spid="5"/>
+                                        </p:tgtEl>
+                                      </p:cBhvr>
+                                    </p:animEffect>
+                                  </p:childTnLst>
+                                </p:cTn>
+                              </p:par>
+                            </p:childTnLst>
+                          </p:cTn>
+                        </p:par>
+                      </p:childTnLst>
+                    </p:cTn>
+                  </p:par>
+                </p:childTnLst>
+              </p:cTn>
+              <p:prevCondLst>
+                <p:cond evt="onPrev" delay="0">
+                  <p:tgtEl>
+                    <p:sldTgt/>
+                  </p:tgtEl>
+                </p:cond>
+              </p:prevCondLst>
+              <p:nextCondLst>
+                <p:cond evt="onNext" delay="0">
+                  <p:tgtEl>
+                    <p:sldTgt/>
+                  </p:tgtEl>
+                </p:cond>
+              </p:nextCondLst>
+            </p:seq>
+          </p:childTnLst>
+        </p:cTn>
+      </p:par>
+    </p:tnLst>
+    <p:bldLst>
+      <p:bldP spid="4" grpId="0"/>
+      <p:bldP spid="5" grpId="0"/>
+      <p:bldP spid="6" grpId="0"/>
+    </p:bldLst>
+  </p:timing>
 </p:sld>
 </file>
 

</xml_diff>

<commit_message>
Removed unrelated content @ the beginning of the embeddings notebook.
</commit_message>
<xml_diff>
--- a/presentations/01_nlp_intro.pptx
+++ b/presentations/01_nlp_intro.pptx
@@ -3344,7 +3344,7 @@
           <a:p>
             <a:fld id="{FD93C9B2-20F6-4DB1-B471-224337D0AC79}" type="datetimeFigureOut">
               <a:rPr lang="en-US" smtClean="0"/>
-              <a:t>10/13/2022</a:t>
+              <a:t>10/17/2022</a:t>
             </a:fld>
             <a:endParaRPr lang="en-US"/>
           </a:p>
@@ -4826,18 +4826,15 @@
                 <a:effectLst/>
                 <a:latin typeface="+mn-lt"/>
               </a:rPr>
-              <a:t>An NLP model mimics human language abilities but has no human-level understanding – </a:t>
-            </a:r>
-            <a:r>
-              <a:rPr lang="en-US" b="1" i="0" dirty="0">
-                <a:solidFill>
-                  <a:srgbClr val="3C3C3B"/>
-                </a:solidFill>
-                <a:effectLst/>
-                <a:latin typeface="+mn-lt"/>
-              </a:rPr>
-              <a:t>key point</a:t>
-            </a:r>
+              <a:t>An NLP model mimics human language abilities but has no human-level understanding </a:t>
+            </a:r>
+            <a:endParaRPr lang="en-US" b="1" i="0" dirty="0">
+              <a:solidFill>
+                <a:srgbClr val="3C3C3B"/>
+              </a:solidFill>
+              <a:effectLst/>
+              <a:latin typeface="+mn-lt"/>
+            </a:endParaRPr>
           </a:p>
           <a:p>
             <a:pPr marL="228600" marR="0" lvl="0" indent="-228600" algn="l" defTabSz="914400" rtl="0" eaLnBrk="1" fontAlgn="auto" latinLnBrk="0" hangingPunct="1">
@@ -6687,7 +6684,7 @@
           <a:p>
             <a:fld id="{C3F78080-8D0A-4BE8-A5B4-CB115102D524}" type="datetimeFigureOut">
               <a:rPr lang="en-US" smtClean="0"/>
-              <a:t>10/13/2022</a:t>
+              <a:t>10/17/2022</a:t>
             </a:fld>
             <a:endParaRPr lang="en-US"/>
           </a:p>
@@ -6885,7 +6882,7 @@
           <a:p>
             <a:fld id="{C3F78080-8D0A-4BE8-A5B4-CB115102D524}" type="datetimeFigureOut">
               <a:rPr lang="en-US" smtClean="0"/>
-              <a:t>10/13/2022</a:t>
+              <a:t>10/17/2022</a:t>
             </a:fld>
             <a:endParaRPr lang="en-US"/>
           </a:p>
@@ -7093,7 +7090,7 @@
           <a:p>
             <a:fld id="{C3F78080-8D0A-4BE8-A5B4-CB115102D524}" type="datetimeFigureOut">
               <a:rPr lang="en-US" smtClean="0"/>
-              <a:t>10/13/2022</a:t>
+              <a:t>10/17/2022</a:t>
             </a:fld>
             <a:endParaRPr lang="en-US"/>
           </a:p>
@@ -7291,7 +7288,7 @@
           <a:p>
             <a:fld id="{C3F78080-8D0A-4BE8-A5B4-CB115102D524}" type="datetimeFigureOut">
               <a:rPr lang="en-US" smtClean="0"/>
-              <a:t>10/13/2022</a:t>
+              <a:t>10/17/2022</a:t>
             </a:fld>
             <a:endParaRPr lang="en-US"/>
           </a:p>
@@ -7566,7 +7563,7 @@
           <a:p>
             <a:fld id="{C3F78080-8D0A-4BE8-A5B4-CB115102D524}" type="datetimeFigureOut">
               <a:rPr lang="en-US" smtClean="0"/>
-              <a:t>10/13/2022</a:t>
+              <a:t>10/17/2022</a:t>
             </a:fld>
             <a:endParaRPr lang="en-US"/>
           </a:p>
@@ -7831,7 +7828,7 @@
           <a:p>
             <a:fld id="{C3F78080-8D0A-4BE8-A5B4-CB115102D524}" type="datetimeFigureOut">
               <a:rPr lang="en-US" smtClean="0"/>
-              <a:t>10/13/2022</a:t>
+              <a:t>10/17/2022</a:t>
             </a:fld>
             <a:endParaRPr lang="en-US"/>
           </a:p>
@@ -8243,7 +8240,7 @@
           <a:p>
             <a:fld id="{C3F78080-8D0A-4BE8-A5B4-CB115102D524}" type="datetimeFigureOut">
               <a:rPr lang="en-US" smtClean="0"/>
-              <a:t>10/13/2022</a:t>
+              <a:t>10/17/2022</a:t>
             </a:fld>
             <a:endParaRPr lang="en-US"/>
           </a:p>
@@ -8384,7 +8381,7 @@
           <a:p>
             <a:fld id="{C3F78080-8D0A-4BE8-A5B4-CB115102D524}" type="datetimeFigureOut">
               <a:rPr lang="en-US" smtClean="0"/>
-              <a:t>10/13/2022</a:t>
+              <a:t>10/17/2022</a:t>
             </a:fld>
             <a:endParaRPr lang="en-US"/>
           </a:p>
@@ -8497,7 +8494,7 @@
           <a:p>
             <a:fld id="{C3F78080-8D0A-4BE8-A5B4-CB115102D524}" type="datetimeFigureOut">
               <a:rPr lang="en-US" smtClean="0"/>
-              <a:t>10/13/2022</a:t>
+              <a:t>10/17/2022</a:t>
             </a:fld>
             <a:endParaRPr lang="en-US"/>
           </a:p>
@@ -8808,7 +8805,7 @@
           <a:p>
             <a:fld id="{C3F78080-8D0A-4BE8-A5B4-CB115102D524}" type="datetimeFigureOut">
               <a:rPr lang="en-US" smtClean="0"/>
-              <a:t>10/13/2022</a:t>
+              <a:t>10/17/2022</a:t>
             </a:fld>
             <a:endParaRPr lang="en-US"/>
           </a:p>
@@ -9096,7 +9093,7 @@
           <a:p>
             <a:fld id="{C3F78080-8D0A-4BE8-A5B4-CB115102D524}" type="datetimeFigureOut">
               <a:rPr lang="en-US" smtClean="0"/>
-              <a:t>10/13/2022</a:t>
+              <a:t>10/17/2022</a:t>
             </a:fld>
             <a:endParaRPr lang="en-US"/>
           </a:p>
@@ -9337,7 +9334,7 @@
           <a:p>
             <a:fld id="{C3F78080-8D0A-4BE8-A5B4-CB115102D524}" type="datetimeFigureOut">
               <a:rPr lang="en-US" smtClean="0"/>
-              <a:t>10/13/2022</a:t>
+              <a:t>10/17/2022</a:t>
             </a:fld>
             <a:endParaRPr lang="en-US"/>
           </a:p>

</xml_diff>